<commit_message>
Added results slide for linear regression output
</commit_message>
<xml_diff>
--- a/OptimisingCerealProduction.pptx
+++ b/OptimisingCerealProduction.pptx
@@ -16,7 +16,7 @@
     <p:sldId id="266" r:id="rId7"/>
     <p:sldId id="261" r:id="rId8"/>
     <p:sldId id="262" r:id="rId9"/>
-    <p:sldId id="267" r:id="rId10"/>
+    <p:sldId id="268" r:id="rId10"/>
   </p:sldIdLst>
   <p:sldSz cx="12192000" cy="6858000"/>
   <p:notesSz cx="6858000" cy="9144000"/>
@@ -205,7 +205,7 @@
           <a:p>
             <a:fld id="{1BE5E1BF-341A-DC42-806A-8C60AD490205}" type="datetimeFigureOut">
               <a:rPr lang="en-US" smtClean="0"/>
-              <a:t>5/9/18</a:t>
+              <a:t>5/9/2018</a:t>
             </a:fld>
             <a:endParaRPr lang="en-US"/>
           </a:p>
@@ -877,7 +877,7 @@
           <a:p>
             <a:fld id="{11313FC5-3D18-E34A-8895-F4877EF51C8E}" type="datetimeFigureOut">
               <a:rPr lang="en-US" smtClean="0"/>
-              <a:t>5/9/18</a:t>
+              <a:t>5/9/2018</a:t>
             </a:fld>
             <a:endParaRPr lang="en-US"/>
           </a:p>
@@ -1075,7 +1075,7 @@
           <a:p>
             <a:fld id="{11313FC5-3D18-E34A-8895-F4877EF51C8E}" type="datetimeFigureOut">
               <a:rPr lang="en-US" smtClean="0"/>
-              <a:t>5/9/18</a:t>
+              <a:t>5/9/2018</a:t>
             </a:fld>
             <a:endParaRPr lang="en-US"/>
           </a:p>
@@ -1283,7 +1283,7 @@
           <a:p>
             <a:fld id="{11313FC5-3D18-E34A-8895-F4877EF51C8E}" type="datetimeFigureOut">
               <a:rPr lang="en-US" smtClean="0"/>
-              <a:t>5/9/18</a:t>
+              <a:t>5/9/2018</a:t>
             </a:fld>
             <a:endParaRPr lang="en-US"/>
           </a:p>
@@ -1561,7 +1561,7 @@
           <a:p>
             <a:fld id="{11313FC5-3D18-E34A-8895-F4877EF51C8E}" type="datetimeFigureOut">
               <a:rPr lang="en-US" smtClean="0"/>
-              <a:t>5/9/18</a:t>
+              <a:t>5/9/2018</a:t>
             </a:fld>
             <a:endParaRPr lang="en-US"/>
           </a:p>
@@ -1836,7 +1836,7 @@
           <a:p>
             <a:fld id="{11313FC5-3D18-E34A-8895-F4877EF51C8E}" type="datetimeFigureOut">
               <a:rPr lang="en-US" smtClean="0"/>
-              <a:t>5/9/18</a:t>
+              <a:t>5/9/2018</a:t>
             </a:fld>
             <a:endParaRPr lang="en-US"/>
           </a:p>
@@ -2101,7 +2101,7 @@
           <a:p>
             <a:fld id="{11313FC5-3D18-E34A-8895-F4877EF51C8E}" type="datetimeFigureOut">
               <a:rPr lang="en-US" smtClean="0"/>
-              <a:t>5/9/18</a:t>
+              <a:t>5/9/2018</a:t>
             </a:fld>
             <a:endParaRPr lang="en-US"/>
           </a:p>
@@ -2513,7 +2513,7 @@
           <a:p>
             <a:fld id="{11313FC5-3D18-E34A-8895-F4877EF51C8E}" type="datetimeFigureOut">
               <a:rPr lang="en-US" smtClean="0"/>
-              <a:t>5/9/18</a:t>
+              <a:t>5/9/2018</a:t>
             </a:fld>
             <a:endParaRPr lang="en-US"/>
           </a:p>
@@ -2654,7 +2654,7 @@
           <a:p>
             <a:fld id="{11313FC5-3D18-E34A-8895-F4877EF51C8E}" type="datetimeFigureOut">
               <a:rPr lang="en-US" smtClean="0"/>
-              <a:t>5/9/18</a:t>
+              <a:t>5/9/2018</a:t>
             </a:fld>
             <a:endParaRPr lang="en-US"/>
           </a:p>
@@ -2767,7 +2767,7 @@
           <a:p>
             <a:fld id="{11313FC5-3D18-E34A-8895-F4877EF51C8E}" type="datetimeFigureOut">
               <a:rPr lang="en-US" smtClean="0"/>
-              <a:t>5/9/18</a:t>
+              <a:t>5/9/2018</a:t>
             </a:fld>
             <a:endParaRPr lang="en-US"/>
           </a:p>
@@ -3078,7 +3078,7 @@
           <a:p>
             <a:fld id="{11313FC5-3D18-E34A-8895-F4877EF51C8E}" type="datetimeFigureOut">
               <a:rPr lang="en-US" smtClean="0"/>
-              <a:t>5/9/18</a:t>
+              <a:t>5/9/2018</a:t>
             </a:fld>
             <a:endParaRPr lang="en-US"/>
           </a:p>
@@ -3366,7 +3366,7 @@
           <a:p>
             <a:fld id="{11313FC5-3D18-E34A-8895-F4877EF51C8E}" type="datetimeFigureOut">
               <a:rPr lang="en-US" smtClean="0"/>
-              <a:t>5/9/18</a:t>
+              <a:t>5/9/2018</a:t>
             </a:fld>
             <a:endParaRPr lang="en-US"/>
           </a:p>
@@ -3626,7 +3626,7 @@
           <a:p>
             <a:fld id="{11313FC5-3D18-E34A-8895-F4877EF51C8E}" type="datetimeFigureOut">
               <a:rPr lang="en-US" smtClean="0"/>
-              <a:t>5/9/18</a:t>
+              <a:t>5/9/2018</a:t>
             </a:fld>
             <a:endParaRPr lang="en-US"/>
           </a:p>
@@ -7561,10 +7561,198 @@
           </a:p>
         </p:txBody>
       </p:sp>
+      <p:pic>
+        <p:nvPicPr>
+          <p:cNvPr id="6" name="Picture 5">
+            <a:extLst>
+              <a:ext uri="{FF2B5EF4-FFF2-40B4-BE49-F238E27FC236}">
+                <a16:creationId xmlns:a16="http://schemas.microsoft.com/office/drawing/2014/main" id="{6B3885EE-C383-4AE1-8086-FD4C45D12D7E}"/>
+              </a:ext>
+            </a:extLst>
+          </p:cNvPr>
+          <p:cNvPicPr>
+            <a:picLocks noChangeAspect="1"/>
+          </p:cNvPicPr>
+          <p:nvPr/>
+        </p:nvPicPr>
+        <p:blipFill>
+          <a:blip r:embed="rId2"/>
+          <a:stretch>
+            <a:fillRect/>
+          </a:stretch>
+        </p:blipFill>
+        <p:spPr>
+          <a:xfrm>
+            <a:off x="5614889" y="1494099"/>
+            <a:ext cx="5249564" cy="3869802"/>
+          </a:xfrm>
+          <a:prstGeom prst="rect">
+            <a:avLst/>
+          </a:prstGeom>
+        </p:spPr>
+      </p:pic>
+      <mc:AlternateContent xmlns:mc="http://schemas.openxmlformats.org/markup-compatibility/2006">
+        <mc:Choice xmlns:a14="http://schemas.microsoft.com/office/drawing/2010/main" Requires="a14">
+          <p:sp>
+            <p:nvSpPr>
+              <p:cNvPr id="8" name="TextBox 7">
+                <a:extLst>
+                  <a:ext uri="{FF2B5EF4-FFF2-40B4-BE49-F238E27FC236}">
+                    <a16:creationId xmlns:a16="http://schemas.microsoft.com/office/drawing/2014/main" id="{D2812819-2141-45BD-9BAC-9E8329A3EFF6}"/>
+                  </a:ext>
+                </a:extLst>
+              </p:cNvPr>
+              <p:cNvSpPr txBox="1"/>
+              <p:nvPr/>
+            </p:nvSpPr>
+            <p:spPr>
+              <a:xfrm>
+                <a:off x="975765" y="2619579"/>
+                <a:ext cx="4283242" cy="2316660"/>
+              </a:xfrm>
+              <a:prstGeom prst="rect">
+                <a:avLst/>
+              </a:prstGeom>
+              <a:noFill/>
+            </p:spPr>
+            <p:txBody>
+              <a:bodyPr wrap="square" rtlCol="0">
+                <a:spAutoFit/>
+              </a:bodyPr>
+              <a:lstStyle/>
+              <a:p>
+                <a:r>
+                  <a:rPr lang="en-US" sz="2400" b="1" dirty="0">
+                    <a:ln>
+                      <a:solidFill>
+                        <a:schemeClr val="tx1"/>
+                      </a:solidFill>
+                    </a:ln>
+                    <a:solidFill>
+                      <a:schemeClr val="bg1"/>
+                    </a:solidFill>
+                  </a:rPr>
+                  <a:t>Linear Regression on a subset of the variables produces a highly accurate model. The resulting model has a mean </a:t>
+                </a:r>
+                <a14:m>
+                  <m:oMath xmlns:m="http://schemas.openxmlformats.org/officeDocument/2006/math">
+                    <m:sSup>
+                      <m:sSupPr>
+                        <m:ctrlPr>
+                          <a:rPr lang="en-US" sz="2400" b="1" i="1" smtClean="0">
+                            <a:ln>
+                              <a:solidFill>
+                                <a:schemeClr val="tx1"/>
+                              </a:solidFill>
+                            </a:ln>
+                            <a:solidFill>
+                              <a:schemeClr val="bg1"/>
+                            </a:solidFill>
+                            <a:latin typeface="Cambria Math" panose="02040503050406030204" pitchFamily="18" charset="0"/>
+                          </a:rPr>
+                        </m:ctrlPr>
+                      </m:sSupPr>
+                      <m:e>
+                        <m:r>
+                          <a:rPr lang="en-US" sz="2400" b="1" i="1" smtClean="0">
+                            <a:ln>
+                              <a:solidFill>
+                                <a:schemeClr val="tx1"/>
+                              </a:solidFill>
+                            </a:ln>
+                            <a:solidFill>
+                              <a:schemeClr val="bg1"/>
+                            </a:solidFill>
+                            <a:latin typeface="Cambria Math" panose="02040503050406030204" pitchFamily="18" charset="0"/>
+                          </a:rPr>
+                          <m:t>𝑹</m:t>
+                        </m:r>
+                      </m:e>
+                      <m:sup>
+                        <m:r>
+                          <a:rPr lang="en-US" sz="2400" b="1" i="1" smtClean="0">
+                            <a:ln>
+                              <a:solidFill>
+                                <a:schemeClr val="tx1"/>
+                              </a:solidFill>
+                            </a:ln>
+                            <a:solidFill>
+                              <a:schemeClr val="bg1"/>
+                            </a:solidFill>
+                            <a:latin typeface="Cambria Math" panose="02040503050406030204" pitchFamily="18" charset="0"/>
+                          </a:rPr>
+                          <m:t>𝟐</m:t>
+                        </m:r>
+                      </m:sup>
+                    </m:sSup>
+                  </m:oMath>
+                </a14:m>
+                <a:r>
+                  <a:rPr lang="en-US" sz="2400" b="1" dirty="0">
+                    <a:ln>
+                      <a:solidFill>
+                        <a:schemeClr val="tx1"/>
+                      </a:solidFill>
+                    </a:ln>
+                    <a:solidFill>
+                      <a:schemeClr val="bg1"/>
+                    </a:solidFill>
+                  </a:rPr>
+                  <a:t> of 0.969 indicating a high degree of accuracy</a:t>
+                </a:r>
+              </a:p>
+            </p:txBody>
+          </p:sp>
+        </mc:Choice>
+        <mc:Fallback>
+          <p:sp>
+            <p:nvSpPr>
+              <p:cNvPr id="8" name="TextBox 7">
+                <a:extLst>
+                  <a:ext uri="{FF2B5EF4-FFF2-40B4-BE49-F238E27FC236}">
+                    <a16:creationId xmlns:a16="http://schemas.microsoft.com/office/drawing/2014/main" id="{D2812819-2141-45BD-9BAC-9E8329A3EFF6}"/>
+                  </a:ext>
+                </a:extLst>
+              </p:cNvPr>
+              <p:cNvSpPr txBox="1">
+                <a:spLocks noRot="1" noChangeAspect="1" noMove="1" noResize="1" noEditPoints="1" noAdjustHandles="1" noChangeArrowheads="1" noChangeShapeType="1" noTextEdit="1"/>
+              </p:cNvSpPr>
+              <p:nvPr/>
+            </p:nvSpPr>
+            <p:spPr>
+              <a:xfrm>
+                <a:off x="975765" y="2619579"/>
+                <a:ext cx="4283242" cy="2316660"/>
+              </a:xfrm>
+              <a:prstGeom prst="rect">
+                <a:avLst/>
+              </a:prstGeom>
+              <a:blipFill>
+                <a:blip r:embed="rId3"/>
+                <a:stretch>
+                  <a:fillRect/>
+                </a:stretch>
+              </a:blipFill>
+            </p:spPr>
+            <p:txBody>
+              <a:bodyPr/>
+              <a:lstStyle/>
+              <a:p>
+                <a:r>
+                  <a:rPr lang="en-US">
+                    <a:noFill/>
+                  </a:rPr>
+                  <a:t> </a:t>
+                </a:r>
+              </a:p>
+            </p:txBody>
+          </p:sp>
+        </mc:Fallback>
+      </mc:AlternateContent>
     </p:spTree>
     <p:extLst>
       <p:ext uri="{BB962C8B-B14F-4D97-AF65-F5344CB8AC3E}">
-        <p14:creationId xmlns:p14="http://schemas.microsoft.com/office/powerpoint/2010/main" val="4089872734"/>
+        <p14:creationId xmlns:p14="http://schemas.microsoft.com/office/powerpoint/2010/main" val="3894045929"/>
       </p:ext>
     </p:extLst>
   </p:cSld>

</xml_diff>